<commit_message>
Switch to Arial, a font all should have
</commit_message>
<xml_diff>
--- a/docs/figure-pptx/explain-filter.pptx
+++ b/docs/figure-pptx/explain-filter.pptx
@@ -197,7 +197,7 @@
           <a:p>
             <a:fld id="{EEE1F527-089D-457B-865D-1FD4CCD90545}" type="datetimeFigureOut">
               <a:rPr lang="en-US" smtClean="0"/>
-              <a:t>8/23/2024</a:t>
+              <a:t>8/26/2024</a:t>
             </a:fld>
             <a:endParaRPr lang="en-US"/>
           </a:p>
@@ -682,7 +682,7 @@
           <a:p>
             <a:fld id="{5700AFFE-FBA7-4C72-98C2-EBFAFBD34EC6}" type="datetimeFigureOut">
               <a:rPr lang="en-US" smtClean="0"/>
-              <a:t>8/23/2024</a:t>
+              <a:t>8/26/2024</a:t>
             </a:fld>
             <a:endParaRPr lang="en-US"/>
           </a:p>
@@ -852,7 +852,7 @@
           <a:p>
             <a:fld id="{5700AFFE-FBA7-4C72-98C2-EBFAFBD34EC6}" type="datetimeFigureOut">
               <a:rPr lang="en-US" smtClean="0"/>
-              <a:t>8/23/2024</a:t>
+              <a:t>8/26/2024</a:t>
             </a:fld>
             <a:endParaRPr lang="en-US"/>
           </a:p>
@@ -1032,7 +1032,7 @@
           <a:p>
             <a:fld id="{5700AFFE-FBA7-4C72-98C2-EBFAFBD34EC6}" type="datetimeFigureOut">
               <a:rPr lang="en-US" smtClean="0"/>
-              <a:t>8/23/2024</a:t>
+              <a:t>8/26/2024</a:t>
             </a:fld>
             <a:endParaRPr lang="en-US"/>
           </a:p>
@@ -1202,7 +1202,7 @@
           <a:p>
             <a:fld id="{5700AFFE-FBA7-4C72-98C2-EBFAFBD34EC6}" type="datetimeFigureOut">
               <a:rPr lang="en-US" smtClean="0"/>
-              <a:t>8/23/2024</a:t>
+              <a:t>8/26/2024</a:t>
             </a:fld>
             <a:endParaRPr lang="en-US"/>
           </a:p>
@@ -1448,7 +1448,7 @@
           <a:p>
             <a:fld id="{5700AFFE-FBA7-4C72-98C2-EBFAFBD34EC6}" type="datetimeFigureOut">
               <a:rPr lang="en-US" smtClean="0"/>
-              <a:t>8/23/2024</a:t>
+              <a:t>8/26/2024</a:t>
             </a:fld>
             <a:endParaRPr lang="en-US"/>
           </a:p>
@@ -1680,7 +1680,7 @@
           <a:p>
             <a:fld id="{5700AFFE-FBA7-4C72-98C2-EBFAFBD34EC6}" type="datetimeFigureOut">
               <a:rPr lang="en-US" smtClean="0"/>
-              <a:t>8/23/2024</a:t>
+              <a:t>8/26/2024</a:t>
             </a:fld>
             <a:endParaRPr lang="en-US"/>
           </a:p>
@@ -2047,7 +2047,7 @@
           <a:p>
             <a:fld id="{5700AFFE-FBA7-4C72-98C2-EBFAFBD34EC6}" type="datetimeFigureOut">
               <a:rPr lang="en-US" smtClean="0"/>
-              <a:t>8/23/2024</a:t>
+              <a:t>8/26/2024</a:t>
             </a:fld>
             <a:endParaRPr lang="en-US"/>
           </a:p>
@@ -2165,7 +2165,7 @@
           <a:p>
             <a:fld id="{5700AFFE-FBA7-4C72-98C2-EBFAFBD34EC6}" type="datetimeFigureOut">
               <a:rPr lang="en-US" smtClean="0"/>
-              <a:t>8/23/2024</a:t>
+              <a:t>8/26/2024</a:t>
             </a:fld>
             <a:endParaRPr lang="en-US"/>
           </a:p>
@@ -2260,7 +2260,7 @@
           <a:p>
             <a:fld id="{5700AFFE-FBA7-4C72-98C2-EBFAFBD34EC6}" type="datetimeFigureOut">
               <a:rPr lang="en-US" smtClean="0"/>
-              <a:t>8/23/2024</a:t>
+              <a:t>8/26/2024</a:t>
             </a:fld>
             <a:endParaRPr lang="en-US"/>
           </a:p>
@@ -2537,7 +2537,7 @@
           <a:p>
             <a:fld id="{5700AFFE-FBA7-4C72-98C2-EBFAFBD34EC6}" type="datetimeFigureOut">
               <a:rPr lang="en-US" smtClean="0"/>
-              <a:t>8/23/2024</a:t>
+              <a:t>8/26/2024</a:t>
             </a:fld>
             <a:endParaRPr lang="en-US"/>
           </a:p>
@@ -2794,7 +2794,7 @@
           <a:p>
             <a:fld id="{5700AFFE-FBA7-4C72-98C2-EBFAFBD34EC6}" type="datetimeFigureOut">
               <a:rPr lang="en-US" smtClean="0"/>
-              <a:t>8/23/2024</a:t>
+              <a:t>8/26/2024</a:t>
             </a:fld>
             <a:endParaRPr lang="en-US"/>
           </a:p>
@@ -3007,7 +3007,7 @@
           <a:p>
             <a:fld id="{5700AFFE-FBA7-4C72-98C2-EBFAFBD34EC6}" type="datetimeFigureOut">
               <a:rPr lang="en-US" smtClean="0"/>
-              <a:t>8/23/2024</a:t>
+              <a:t>8/26/2024</a:t>
             </a:fld>
             <a:endParaRPr lang="en-US"/>
           </a:p>
@@ -3465,9 +3465,9 @@
           <a:p>
             <a:r>
               <a:rPr lang="en-US" sz="1000" dirty="0">
-                <a:latin typeface="Cascadia Code" panose="020B0609020000020004" pitchFamily="49" charset="0"/>
+                <a:latin typeface="Arial" panose="020B0604020202020204" pitchFamily="34" charset="0"/>
                 <a:ea typeface="Cascadia Code" panose="020B0609020000020004" pitchFamily="49" charset="0"/>
-                <a:cs typeface="Cascadia Code" panose="020B0609020000020004" pitchFamily="49" charset="0"/>
+                <a:cs typeface="Arial" panose="020B0604020202020204" pitchFamily="34" charset="0"/>
               </a:rPr>
               <a:t>Estimator</a:t>
             </a:r>
@@ -3517,9 +3517,9 @@
           <a:p>
             <a:r>
               <a:rPr lang="en-US" sz="1000" dirty="0">
-                <a:latin typeface="Cascadia Code" panose="020B0609020000020004" pitchFamily="49" charset="0"/>
+                <a:latin typeface="Arial" panose="020B0604020202020204" pitchFamily="34" charset="0"/>
                 <a:ea typeface="Cascadia Code" panose="020B0609020000020004" pitchFamily="49" charset="0"/>
-                <a:cs typeface="Cascadia Code" panose="020B0609020000020004" pitchFamily="49" charset="0"/>
+                <a:cs typeface="Arial" panose="020B0604020202020204" pitchFamily="34" charset="0"/>
               </a:rPr>
               <a:t>Filter</a:t>
             </a:r>
@@ -3569,9 +3569,9 @@
           <a:p>
             <a:r>
               <a:rPr lang="en-US" sz="1000" dirty="0">
-                <a:latin typeface="Cascadia Code" panose="020B0609020000020004" pitchFamily="49" charset="0"/>
+                <a:latin typeface="Arial" panose="020B0604020202020204" pitchFamily="34" charset="0"/>
                 <a:ea typeface="Cascadia Code" panose="020B0609020000020004" pitchFamily="49" charset="0"/>
-                <a:cs typeface="Cascadia Code" panose="020B0609020000020004" pitchFamily="49" charset="0"/>
+                <a:cs typeface="Arial" panose="020B0604020202020204" pitchFamily="34" charset="0"/>
               </a:rPr>
               <a:t>Model</a:t>
             </a:r>
@@ -3689,9 +3689,9 @@
             <a:p>
               <a:pPr algn="ctr"/>
               <a:endParaRPr lang="en-US">
-                <a:latin typeface="Cascadia Code" panose="020B0609020000020004" pitchFamily="49" charset="0"/>
+                <a:latin typeface="Arial" panose="020B0604020202020204" pitchFamily="34" charset="0"/>
                 <a:ea typeface="Cascadia Code" panose="020B0609020000020004" pitchFamily="49" charset="0"/>
-                <a:cs typeface="Cascadia Code" panose="020B0609020000020004" pitchFamily="49" charset="0"/>
+                <a:cs typeface="Arial" panose="020B0604020202020204" pitchFamily="34" charset="0"/>
               </a:endParaRPr>
             </a:p>
           </p:txBody>
@@ -3743,9 +3743,9 @@
             <a:p>
               <a:pPr algn="ctr"/>
               <a:endParaRPr lang="en-US" dirty="0">
-                <a:latin typeface="Cascadia Code" panose="020B0609020000020004" pitchFamily="49" charset="0"/>
+                <a:latin typeface="Arial" panose="020B0604020202020204" pitchFamily="34" charset="0"/>
                 <a:ea typeface="Cascadia Code" panose="020B0609020000020004" pitchFamily="49" charset="0"/>
-                <a:cs typeface="Cascadia Code" panose="020B0609020000020004" pitchFamily="49" charset="0"/>
+                <a:cs typeface="Arial" panose="020B0604020202020204" pitchFamily="34" charset="0"/>
               </a:endParaRPr>
             </a:p>
           </p:txBody>
@@ -3864,9 +3864,9 @@
             <a:p>
               <a:pPr algn="ctr"/>
               <a:endParaRPr lang="en-US">
-                <a:latin typeface="Cascadia Code" panose="020B0609020000020004" pitchFamily="49" charset="0"/>
+                <a:latin typeface="Arial" panose="020B0604020202020204" pitchFamily="34" charset="0"/>
                 <a:ea typeface="Cascadia Code" panose="020B0609020000020004" pitchFamily="49" charset="0"/>
-                <a:cs typeface="Cascadia Code" panose="020B0609020000020004" pitchFamily="49" charset="0"/>
+                <a:cs typeface="Arial" panose="020B0604020202020204" pitchFamily="34" charset="0"/>
               </a:endParaRPr>
             </a:p>
           </p:txBody>
@@ -3918,9 +3918,9 @@
             <a:p>
               <a:pPr algn="ctr"/>
               <a:endParaRPr lang="en-US" dirty="0">
-                <a:latin typeface="Cascadia Code" panose="020B0609020000020004" pitchFamily="49" charset="0"/>
+                <a:latin typeface="Arial" panose="020B0604020202020204" pitchFamily="34" charset="0"/>
                 <a:ea typeface="Cascadia Code" panose="020B0609020000020004" pitchFamily="49" charset="0"/>
-                <a:cs typeface="Cascadia Code" panose="020B0609020000020004" pitchFamily="49" charset="0"/>
+                <a:cs typeface="Arial" panose="020B0604020202020204" pitchFamily="34" charset="0"/>
               </a:endParaRPr>
             </a:p>
           </p:txBody>
@@ -4039,9 +4039,9 @@
             <a:p>
               <a:pPr algn="ctr"/>
               <a:endParaRPr lang="en-US">
-                <a:latin typeface="Cascadia Code" panose="020B0609020000020004" pitchFamily="49" charset="0"/>
+                <a:latin typeface="Arial" panose="020B0604020202020204" pitchFamily="34" charset="0"/>
                 <a:ea typeface="Cascadia Code" panose="020B0609020000020004" pitchFamily="49" charset="0"/>
-                <a:cs typeface="Cascadia Code" panose="020B0609020000020004" pitchFamily="49" charset="0"/>
+                <a:cs typeface="Arial" panose="020B0604020202020204" pitchFamily="34" charset="0"/>
               </a:endParaRPr>
             </a:p>
           </p:txBody>
@@ -4093,9 +4093,9 @@
             <a:p>
               <a:pPr algn="ctr"/>
               <a:endParaRPr lang="en-US" dirty="0">
-                <a:latin typeface="Cascadia Code" panose="020B0609020000020004" pitchFamily="49" charset="0"/>
+                <a:latin typeface="Arial" panose="020B0604020202020204" pitchFamily="34" charset="0"/>
                 <a:ea typeface="Cascadia Code" panose="020B0609020000020004" pitchFamily="49" charset="0"/>
-                <a:cs typeface="Cascadia Code" panose="020B0609020000020004" pitchFamily="49" charset="0"/>
+                <a:cs typeface="Arial" panose="020B0604020202020204" pitchFamily="34" charset="0"/>
               </a:endParaRPr>
             </a:p>
           </p:txBody>
@@ -4214,9 +4214,9 @@
             <a:p>
               <a:pPr algn="ctr"/>
               <a:endParaRPr lang="en-US">
-                <a:latin typeface="Cascadia Code" panose="020B0609020000020004" pitchFamily="49" charset="0"/>
+                <a:latin typeface="Arial" panose="020B0604020202020204" pitchFamily="34" charset="0"/>
                 <a:ea typeface="Cascadia Code" panose="020B0609020000020004" pitchFamily="49" charset="0"/>
-                <a:cs typeface="Cascadia Code" panose="020B0609020000020004" pitchFamily="49" charset="0"/>
+                <a:cs typeface="Arial" panose="020B0604020202020204" pitchFamily="34" charset="0"/>
               </a:endParaRPr>
             </a:p>
           </p:txBody>
@@ -4268,9 +4268,9 @@
             <a:p>
               <a:pPr algn="ctr"/>
               <a:endParaRPr lang="en-US">
-                <a:latin typeface="Cascadia Code" panose="020B0609020000020004" pitchFamily="49" charset="0"/>
+                <a:latin typeface="Arial" panose="020B0604020202020204" pitchFamily="34" charset="0"/>
                 <a:ea typeface="Cascadia Code" panose="020B0609020000020004" pitchFamily="49" charset="0"/>
-                <a:cs typeface="Cascadia Code" panose="020B0609020000020004" pitchFamily="49" charset="0"/>
+                <a:cs typeface="Arial" panose="020B0604020202020204" pitchFamily="34" charset="0"/>
               </a:endParaRPr>
             </a:p>
           </p:txBody>
@@ -4320,9 +4320,9 @@
             <a:pPr algn="ctr"/>
             <a:r>
               <a:rPr lang="en-US" sz="1000" dirty="0">
-                <a:latin typeface="Cascadia Code" panose="020B0609020000020004" pitchFamily="49" charset="0"/>
+                <a:latin typeface="Arial" panose="020B0604020202020204" pitchFamily="34" charset="0"/>
                 <a:ea typeface="Cascadia Code" panose="020B0609020000020004" pitchFamily="49" charset="0"/>
-                <a:cs typeface="Cascadia Code" panose="020B0609020000020004" pitchFamily="49" charset="0"/>
+                <a:cs typeface="Arial" panose="020B0604020202020204" pitchFamily="34" charset="0"/>
               </a:rPr>
               <a:t>Battery Data</a:t>
             </a:r>
@@ -4346,7 +4346,7 @@
             <p:spPr>
               <a:xfrm>
                 <a:off x="1237056" y="296761"/>
-                <a:ext cx="544765" cy="215444"/>
+                <a:ext cx="512704" cy="215444"/>
               </a:xfrm>
               <a:prstGeom prst="rect">
                 <a:avLst/>
@@ -4359,6 +4359,7 @@
               </a:bodyPr>
               <a:lstStyle/>
               <a:p>
+                <a:pPr/>
                 <a14:m>
                   <m:oMathPara xmlns:m="http://schemas.openxmlformats.org/officeDocument/2006/math">
                     <m:oMathParaPr>
@@ -4440,9 +4441,9 @@
                   </m:oMathPara>
                 </a14:m>
                 <a:endParaRPr lang="en-US" sz="800" dirty="0">
-                  <a:latin typeface="Cascadia Code" panose="020B0609020000020004" pitchFamily="49" charset="0"/>
+                  <a:latin typeface="Arial" panose="020B0604020202020204" pitchFamily="34" charset="0"/>
                   <a:ea typeface="Cascadia Code" panose="020B0609020000020004" pitchFamily="49" charset="0"/>
-                  <a:cs typeface="Cascadia Code" panose="020B0609020000020004" pitchFamily="49" charset="0"/>
+                  <a:cs typeface="Arial" panose="020B0604020202020204" pitchFamily="34" charset="0"/>
                 </a:endParaRPr>
               </a:p>
             </p:txBody>
@@ -4466,7 +4467,7 @@
             <p:spPr>
               <a:xfrm>
                 <a:off x="1237056" y="296761"/>
-                <a:ext cx="544765" cy="215444"/>
+                <a:ext cx="512704" cy="215444"/>
               </a:xfrm>
               <a:prstGeom prst="rect">
                 <a:avLst/>
@@ -4510,7 +4511,7 @@
             <p:spPr>
               <a:xfrm>
                 <a:off x="2553278" y="-9025"/>
-                <a:ext cx="550022" cy="215444"/>
+                <a:ext cx="517962" cy="215444"/>
               </a:xfrm>
               <a:prstGeom prst="rect">
                 <a:avLst/>
@@ -4523,6 +4524,7 @@
               </a:bodyPr>
               <a:lstStyle/>
               <a:p>
+                <a:pPr/>
                 <a14:m>
                   <m:oMathPara xmlns:m="http://schemas.openxmlformats.org/officeDocument/2006/math">
                     <m:oMathParaPr>
@@ -4601,9 +4603,9 @@
                   </m:oMathPara>
                 </a14:m>
                 <a:endParaRPr lang="en-US" sz="800" dirty="0">
-                  <a:latin typeface="Cascadia Code" panose="020B0609020000020004" pitchFamily="49" charset="0"/>
+                  <a:latin typeface="Arial" panose="020B0604020202020204" pitchFamily="34" charset="0"/>
                   <a:ea typeface="Cascadia Code" panose="020B0609020000020004" pitchFamily="49" charset="0"/>
-                  <a:cs typeface="Cascadia Code" panose="020B0609020000020004" pitchFamily="49" charset="0"/>
+                  <a:cs typeface="Arial" panose="020B0604020202020204" pitchFamily="34" charset="0"/>
                 </a:endParaRPr>
               </a:p>
             </p:txBody>
@@ -4627,7 +4629,7 @@
             <p:spPr>
               <a:xfrm>
                 <a:off x="2553278" y="-9025"/>
-                <a:ext cx="550022" cy="215444"/>
+                <a:ext cx="517962" cy="215444"/>
               </a:xfrm>
               <a:prstGeom prst="rect">
                 <a:avLst/>
@@ -4671,7 +4673,7 @@
             <p:spPr>
               <a:xfrm>
                 <a:off x="2696467" y="225443"/>
-                <a:ext cx="547329" cy="215444"/>
+                <a:ext cx="515269" cy="215444"/>
               </a:xfrm>
               <a:prstGeom prst="rect">
                 <a:avLst/>
@@ -4684,6 +4686,7 @@
               </a:bodyPr>
               <a:lstStyle/>
               <a:p>
+                <a:pPr/>
                 <a14:m>
                   <m:oMathPara xmlns:m="http://schemas.openxmlformats.org/officeDocument/2006/math">
                     <m:oMathParaPr>
@@ -4762,9 +4765,9 @@
                   </m:oMathPara>
                 </a14:m>
                 <a:endParaRPr lang="en-US" sz="800" dirty="0">
-                  <a:latin typeface="Cascadia Code" panose="020B0609020000020004" pitchFamily="49" charset="0"/>
+                  <a:latin typeface="Arial" panose="020B0604020202020204" pitchFamily="34" charset="0"/>
                   <a:ea typeface="Cascadia Code" panose="020B0609020000020004" pitchFamily="49" charset="0"/>
-                  <a:cs typeface="Cascadia Code" panose="020B0609020000020004" pitchFamily="49" charset="0"/>
+                  <a:cs typeface="Arial" panose="020B0604020202020204" pitchFamily="34" charset="0"/>
                 </a:endParaRPr>
               </a:p>
             </p:txBody>
@@ -4788,7 +4791,7 @@
             <p:spPr>
               <a:xfrm>
                 <a:off x="2696467" y="225443"/>
-                <a:ext cx="547329" cy="215444"/>
+                <a:ext cx="515269" cy="215444"/>
               </a:xfrm>
               <a:prstGeom prst="rect">
                 <a:avLst/>
@@ -4845,6 +4848,7 @@
               </a:bodyPr>
               <a:lstStyle/>
               <a:p>
+                <a:pPr/>
                 <a14:m>
                   <m:oMathPara xmlns:m="http://schemas.openxmlformats.org/officeDocument/2006/math">
                     <m:oMathParaPr>
@@ -4935,9 +4939,9 @@
                   </m:oMathPara>
                 </a14:m>
                 <a:endParaRPr lang="en-US" sz="800" dirty="0">
-                  <a:latin typeface="Cascadia Code" panose="020B0609020000020004" pitchFamily="49" charset="0"/>
+                  <a:latin typeface="Arial" panose="020B0604020202020204" pitchFamily="34" charset="0"/>
                   <a:ea typeface="Cascadia Code" panose="020B0609020000020004" pitchFamily="49" charset="0"/>
-                  <a:cs typeface="Cascadia Code" panose="020B0609020000020004" pitchFamily="49" charset="0"/>
+                  <a:cs typeface="Arial" panose="020B0604020202020204" pitchFamily="34" charset="0"/>
                 </a:endParaRPr>
               </a:p>
             </p:txBody>
@@ -5047,7 +5051,7 @@
         <p:spPr>
           <a:xfrm>
             <a:off x="768099" y="32407"/>
-            <a:ext cx="569387" cy="215444"/>
+            <a:ext cx="407484" cy="215444"/>
           </a:xfrm>
           <a:prstGeom prst="rect">
             <a:avLst/>
@@ -5062,49 +5066,49 @@
           <a:p>
             <a:r>
               <a:rPr lang="en-US" sz="800" dirty="0">
-                <a:latin typeface="Cascadia Code" panose="020B0609020000020004" pitchFamily="49" charset="0"/>
+                <a:latin typeface="Arial" panose="020B0604020202020204" pitchFamily="34" charset="0"/>
                 <a:ea typeface="Cascadia Code" panose="020B0609020000020004" pitchFamily="49" charset="0"/>
-                <a:cs typeface="Cascadia Code" panose="020B0609020000020004" pitchFamily="49" charset="0"/>
+                <a:cs typeface="Arial" panose="020B0604020202020204" pitchFamily="34" charset="0"/>
               </a:rPr>
               <a:t>(</a:t>
             </a:r>
             <a:r>
               <a:rPr lang="en-US" sz="800" dirty="0" err="1">
-                <a:latin typeface="Cascadia Code" panose="020B0609020000020004" pitchFamily="49" charset="0"/>
+                <a:latin typeface="Arial" panose="020B0604020202020204" pitchFamily="34" charset="0"/>
                 <a:ea typeface="Cascadia Code" panose="020B0609020000020004" pitchFamily="49" charset="0"/>
-                <a:cs typeface="Cascadia Code" panose="020B0609020000020004" pitchFamily="49" charset="0"/>
+                <a:cs typeface="Arial" panose="020B0604020202020204" pitchFamily="34" charset="0"/>
               </a:rPr>
               <a:t>I</a:t>
             </a:r>
             <a:r>
               <a:rPr lang="en-US" sz="800" baseline="-25000" dirty="0" err="1">
-                <a:latin typeface="Cascadia Code" panose="020B0609020000020004" pitchFamily="49" charset="0"/>
+                <a:latin typeface="Arial" panose="020B0604020202020204" pitchFamily="34" charset="0"/>
                 <a:ea typeface="Cascadia Code" panose="020B0609020000020004" pitchFamily="49" charset="0"/>
-                <a:cs typeface="Cascadia Code" panose="020B0609020000020004" pitchFamily="49" charset="0"/>
+                <a:cs typeface="Arial" panose="020B0604020202020204" pitchFamily="34" charset="0"/>
               </a:rPr>
               <a:t>i</a:t>
             </a:r>
             <a:r>
               <a:rPr lang="en-US" sz="800" dirty="0" err="1">
-                <a:latin typeface="Cascadia Code" panose="020B0609020000020004" pitchFamily="49" charset="0"/>
+                <a:latin typeface="Arial" panose="020B0604020202020204" pitchFamily="34" charset="0"/>
                 <a:ea typeface="Cascadia Code" panose="020B0609020000020004" pitchFamily="49" charset="0"/>
-                <a:cs typeface="Cascadia Code" panose="020B0609020000020004" pitchFamily="49" charset="0"/>
+                <a:cs typeface="Arial" panose="020B0604020202020204" pitchFamily="34" charset="0"/>
               </a:rPr>
               <a:t>,V</a:t>
             </a:r>
             <a:r>
               <a:rPr lang="en-US" sz="800" baseline="-25000" dirty="0" err="1">
-                <a:latin typeface="Cascadia Code" panose="020B0609020000020004" pitchFamily="49" charset="0"/>
+                <a:latin typeface="Arial" panose="020B0604020202020204" pitchFamily="34" charset="0"/>
                 <a:ea typeface="Cascadia Code" panose="020B0609020000020004" pitchFamily="49" charset="0"/>
-                <a:cs typeface="Cascadia Code" panose="020B0609020000020004" pitchFamily="49" charset="0"/>
+                <a:cs typeface="Arial" panose="020B0604020202020204" pitchFamily="34" charset="0"/>
               </a:rPr>
               <a:t>i</a:t>
             </a:r>
             <a:r>
               <a:rPr lang="en-US" sz="800" dirty="0">
-                <a:latin typeface="Cascadia Code" panose="020B0609020000020004" pitchFamily="49" charset="0"/>
+                <a:latin typeface="Arial" panose="020B0604020202020204" pitchFamily="34" charset="0"/>
                 <a:ea typeface="Cascadia Code" panose="020B0609020000020004" pitchFamily="49" charset="0"/>
-                <a:cs typeface="Cascadia Code" panose="020B0609020000020004" pitchFamily="49" charset="0"/>
+                <a:cs typeface="Arial" panose="020B0604020202020204" pitchFamily="34" charset="0"/>
               </a:rPr>
               <a:t>)</a:t>
             </a:r>
@@ -5126,7 +5130,7 @@
         <p:spPr>
           <a:xfrm>
             <a:off x="372220" y="500839"/>
-            <a:ext cx="955711" cy="215444"/>
+            <a:ext cx="853119" cy="215444"/>
           </a:xfrm>
           <a:prstGeom prst="rect">
             <a:avLst/>
@@ -5141,57 +5145,57 @@
           <a:p>
             <a:r>
               <a:rPr lang="en-US" sz="800" dirty="0">
-                <a:latin typeface="Cascadia Code" panose="020B0609020000020004" pitchFamily="49" charset="0"/>
+                <a:latin typeface="Arial" panose="020B0604020202020204" pitchFamily="34" charset="0"/>
                 <a:ea typeface="Cascadia Code" panose="020B0609020000020004" pitchFamily="49" charset="0"/>
-                <a:cs typeface="Cascadia Code" panose="020B0609020000020004" pitchFamily="49" charset="0"/>
+                <a:cs typeface="Arial" panose="020B0604020202020204" pitchFamily="34" charset="0"/>
               </a:rPr>
               <a:t>(</a:t>
             </a:r>
             <a:r>
               <a:rPr lang="en-US" sz="800" dirty="0" err="1">
-                <a:latin typeface="Cascadia Code" panose="020B0609020000020004" pitchFamily="49" charset="0"/>
+                <a:latin typeface="Arial" panose="020B0604020202020204" pitchFamily="34" charset="0"/>
                 <a:ea typeface="Cascadia Code" panose="020B0609020000020004" pitchFamily="49" charset="0"/>
-                <a:cs typeface="Cascadia Code" panose="020B0609020000020004" pitchFamily="49" charset="0"/>
+                <a:cs typeface="Arial" panose="020B0604020202020204" pitchFamily="34" charset="0"/>
               </a:rPr>
               <a:t>SOC</a:t>
             </a:r>
             <a:r>
               <a:rPr lang="en-US" sz="800" baseline="-25000" dirty="0" err="1">
-                <a:latin typeface="Cascadia Code" panose="020B0609020000020004" pitchFamily="49" charset="0"/>
+                <a:latin typeface="Arial" panose="020B0604020202020204" pitchFamily="34" charset="0"/>
                 <a:ea typeface="Cascadia Code" panose="020B0609020000020004" pitchFamily="49" charset="0"/>
-                <a:cs typeface="Cascadia Code" panose="020B0609020000020004" pitchFamily="49" charset="0"/>
+                <a:cs typeface="Arial" panose="020B0604020202020204" pitchFamily="34" charset="0"/>
               </a:rPr>
               <a:t>i</a:t>
             </a:r>
             <a:r>
               <a:rPr lang="en-US" sz="800" dirty="0">
-                <a:latin typeface="Cascadia Code" panose="020B0609020000020004" pitchFamily="49" charset="0"/>
+                <a:latin typeface="Arial" panose="020B0604020202020204" pitchFamily="34" charset="0"/>
                 <a:ea typeface="Cascadia Code" panose="020B0609020000020004" pitchFamily="49" charset="0"/>
-                <a:cs typeface="Cascadia Code" panose="020B0609020000020004" pitchFamily="49" charset="0"/>
+                <a:cs typeface="Arial" panose="020B0604020202020204" pitchFamily="34" charset="0"/>
               </a:rPr>
               <a:t>, </a:t>
             </a:r>
             <a:r>
               <a:rPr lang="en-US" sz="800" dirty="0" err="1">
-                <a:latin typeface="Cascadia Code" panose="020B0609020000020004" pitchFamily="49" charset="0"/>
+                <a:latin typeface="Arial" panose="020B0604020202020204" pitchFamily="34" charset="0"/>
                 <a:ea typeface="Cascadia Code" panose="020B0609020000020004" pitchFamily="49" charset="0"/>
-                <a:cs typeface="Cascadia Code" panose="020B0609020000020004" pitchFamily="49" charset="0"/>
+                <a:cs typeface="Arial" panose="020B0604020202020204" pitchFamily="34" charset="0"/>
               </a:rPr>
               <a:t>ASOH</a:t>
             </a:r>
             <a:r>
               <a:rPr lang="en-US" sz="800" baseline="-25000" dirty="0" err="1">
-                <a:latin typeface="Cascadia Code" panose="020B0609020000020004" pitchFamily="49" charset="0"/>
+                <a:latin typeface="Arial" panose="020B0604020202020204" pitchFamily="34" charset="0"/>
                 <a:ea typeface="Cascadia Code" panose="020B0609020000020004" pitchFamily="49" charset="0"/>
-                <a:cs typeface="Cascadia Code" panose="020B0609020000020004" pitchFamily="49" charset="0"/>
+                <a:cs typeface="Arial" panose="020B0604020202020204" pitchFamily="34" charset="0"/>
               </a:rPr>
               <a:t>i</a:t>
             </a:r>
             <a:r>
               <a:rPr lang="en-US" sz="800" dirty="0">
-                <a:latin typeface="Cascadia Code" panose="020B0609020000020004" pitchFamily="49" charset="0"/>
+                <a:latin typeface="Arial" panose="020B0604020202020204" pitchFamily="34" charset="0"/>
                 <a:ea typeface="Cascadia Code" panose="020B0609020000020004" pitchFamily="49" charset="0"/>
-                <a:cs typeface="Cascadia Code" panose="020B0609020000020004" pitchFamily="49" charset="0"/>
+                <a:cs typeface="Arial" panose="020B0604020202020204" pitchFamily="34" charset="0"/>
               </a:rPr>
               <a:t>)</a:t>
             </a:r>

</xml_diff>